<commit_message>
added conclusion and sources to poster (pdf not updated)
</commit_message>
<xml_diff>
--- a/Poster.pptx
+++ b/Poster.pptx
@@ -135,6 +135,13 @@
       </p:ext>
     </p:extLst>
   </p:cmAuthor>
+  <p:cmAuthor id="2" name="Mcmillan, Delaynie  (Student)" initials="MD(" lastIdx="1" clrIdx="1">
+    <p:extLst>
+      <p:ext uri="{19B8F6BF-5375-455C-9EA6-DF929625EA0E}">
+        <p15:presenceInfo xmlns:p15="http://schemas.microsoft.com/office/powerpoint/2012/main" userId="S::s-mcmilland@bsd405.org::78db06bd-4089-492c-b243-0d948b5d11e4" providerId="AD"/>
+      </p:ext>
+    </p:extLst>
+  </p:cmAuthor>
 </p:cmAuthorLst>
 </file>
 
@@ -220,7 +227,7 @@
           <a:p>
             <a:fld id="{7A4C888E-529B-4285-8AEE-73AD0302CA51}" type="datetimeFigureOut">
               <a:rPr lang="en-US" smtClean="0"/>
-              <a:t>25-Aug-20</a:t>
+              <a:t>8/30/20</a:t>
             </a:fld>
             <a:endParaRPr lang="en-US"/>
           </a:p>
@@ -764,7 +771,7 @@
           <a:p>
             <a:fld id="{00B1DE44-7493-4665-A02F-847C79AD84D3}" type="datetimeFigureOut">
               <a:rPr lang="en-US" smtClean="0"/>
-              <a:t>25-Aug-20</a:t>
+              <a:t>8/30/20</a:t>
             </a:fld>
             <a:endParaRPr lang="en-US"/>
           </a:p>
@@ -1107,7 +1114,7 @@
           <a:p>
             <a:fld id="{00B1DE44-7493-4665-A02F-847C79AD84D3}" type="datetimeFigureOut">
               <a:rPr lang="en-US" smtClean="0"/>
-              <a:t>25-Aug-20</a:t>
+              <a:t>8/30/20</a:t>
             </a:fld>
             <a:endParaRPr lang="en-US"/>
           </a:p>
@@ -1508,7 +1515,7 @@
           <a:p>
             <a:fld id="{00B1DE44-7493-4665-A02F-847C79AD84D3}" type="datetimeFigureOut">
               <a:rPr lang="en-US" smtClean="0"/>
-              <a:t>25-Aug-20</a:t>
+              <a:t>8/30/20</a:t>
             </a:fld>
             <a:endParaRPr lang="en-US"/>
           </a:p>
@@ -1844,7 +1851,7 @@
           <a:p>
             <a:fld id="{00B1DE44-7493-4665-A02F-847C79AD84D3}" type="datetimeFigureOut">
               <a:rPr lang="en-US" smtClean="0"/>
-              <a:t>25-Aug-20</a:t>
+              <a:t>8/30/20</a:t>
             </a:fld>
             <a:endParaRPr lang="en-US"/>
           </a:p>
@@ -2164,7 +2171,7 @@
           <a:p>
             <a:fld id="{00B1DE44-7493-4665-A02F-847C79AD84D3}" type="datetimeFigureOut">
               <a:rPr lang="en-US" smtClean="0"/>
-              <a:t>25-Aug-20</a:t>
+              <a:t>8/30/20</a:t>
             </a:fld>
             <a:endParaRPr lang="en-US"/>
           </a:p>
@@ -2560,7 +2567,7 @@
           <a:p>
             <a:fld id="{00B1DE44-7493-4665-A02F-847C79AD84D3}" type="datetimeFigureOut">
               <a:rPr lang="en-US" smtClean="0"/>
-              <a:t>25-Aug-20</a:t>
+              <a:t>8/30/20</a:t>
             </a:fld>
             <a:endParaRPr lang="en-US"/>
           </a:p>
@@ -2817,7 +2824,7 @@
           <a:p>
             <a:fld id="{00B1DE44-7493-4665-A02F-847C79AD84D3}" type="datetimeFigureOut">
               <a:rPr lang="en-US" smtClean="0"/>
-              <a:t>25-Aug-20</a:t>
+              <a:t>8/30/20</a:t>
             </a:fld>
             <a:endParaRPr lang="en-US"/>
           </a:p>
@@ -3079,7 +3086,7 @@
           <a:p>
             <a:fld id="{00B1DE44-7493-4665-A02F-847C79AD84D3}" type="datetimeFigureOut">
               <a:rPr lang="en-US" smtClean="0"/>
-              <a:t>25-Aug-20</a:t>
+              <a:t>8/30/20</a:t>
             </a:fld>
             <a:endParaRPr lang="en-US"/>
           </a:p>
@@ -3346,7 +3353,7 @@
           <a:p>
             <a:fld id="{00B1DE44-7493-4665-A02F-847C79AD84D3}" type="datetimeFigureOut">
               <a:rPr lang="en-US" smtClean="0"/>
-              <a:t>25-Aug-20</a:t>
+              <a:t>8/30/20</a:t>
             </a:fld>
             <a:endParaRPr lang="en-US"/>
           </a:p>
@@ -3675,7 +3682,7 @@
           <a:p>
             <a:fld id="{00B1DE44-7493-4665-A02F-847C79AD84D3}" type="datetimeFigureOut">
               <a:rPr lang="en-US" smtClean="0"/>
-              <a:t>25-Aug-20</a:t>
+              <a:t>8/30/20</a:t>
             </a:fld>
             <a:endParaRPr lang="en-US"/>
           </a:p>
@@ -4003,7 +4010,7 @@
           <a:p>
             <a:fld id="{00B1DE44-7493-4665-A02F-847C79AD84D3}" type="datetimeFigureOut">
               <a:rPr lang="en-US" smtClean="0"/>
-              <a:t>25-Aug-20</a:t>
+              <a:t>8/30/20</a:t>
             </a:fld>
             <a:endParaRPr lang="en-US"/>
           </a:p>
@@ -4460,7 +4467,7 @@
           <a:p>
             <a:fld id="{00B1DE44-7493-4665-A02F-847C79AD84D3}" type="datetimeFigureOut">
               <a:rPr lang="en-US" smtClean="0"/>
-              <a:t>25-Aug-20</a:t>
+              <a:t>8/30/20</a:t>
             </a:fld>
             <a:endParaRPr lang="en-US"/>
           </a:p>
@@ -4665,7 +4672,7 @@
           <a:p>
             <a:fld id="{00B1DE44-7493-4665-A02F-847C79AD84D3}" type="datetimeFigureOut">
               <a:rPr lang="en-US" smtClean="0"/>
-              <a:t>25-Aug-20</a:t>
+              <a:t>8/30/20</a:t>
             </a:fld>
             <a:endParaRPr lang="en-US"/>
           </a:p>
@@ -4842,7 +4849,7 @@
           <a:p>
             <a:fld id="{00B1DE44-7493-4665-A02F-847C79AD84D3}" type="datetimeFigureOut">
               <a:rPr lang="en-US" smtClean="0"/>
-              <a:t>25-Aug-20</a:t>
+              <a:t>8/30/20</a:t>
             </a:fld>
             <a:endParaRPr lang="en-US"/>
           </a:p>
@@ -5180,7 +5187,7 @@
           <a:p>
             <a:fld id="{00B1DE44-7493-4665-A02F-847C79AD84D3}" type="datetimeFigureOut">
               <a:rPr lang="en-US" smtClean="0"/>
-              <a:t>25-Aug-20</a:t>
+              <a:t>8/30/20</a:t>
             </a:fld>
             <a:endParaRPr lang="en-US"/>
           </a:p>
@@ -5530,7 +5537,7 @@
           <a:p>
             <a:fld id="{00B1DE44-7493-4665-A02F-847C79AD84D3}" type="datetimeFigureOut">
               <a:rPr lang="en-US" smtClean="0"/>
-              <a:t>25-Aug-20</a:t>
+              <a:t>8/30/20</a:t>
             </a:fld>
             <a:endParaRPr lang="en-US"/>
           </a:p>
@@ -7647,7 +7654,7 @@
           <a:p>
             <a:fld id="{00B1DE44-7493-4665-A02F-847C79AD84D3}" type="datetimeFigureOut">
               <a:rPr lang="en-US" smtClean="0"/>
-              <a:t>25-Aug-20</a:t>
+              <a:t>8/30/20</a:t>
             </a:fld>
             <a:endParaRPr lang="en-US"/>
           </a:p>
@@ -8453,10 +8460,10 @@
         </p:nvGrpSpPr>
         <p:grpSpPr>
           <a:xfrm>
-            <a:off x="0" y="1044055"/>
-            <a:ext cx="3237759" cy="839541"/>
-            <a:chOff x="-12955" y="1227020"/>
-            <a:chExt cx="3486817" cy="904121"/>
+            <a:off x="12029" y="1044055"/>
+            <a:ext cx="3225730" cy="839541"/>
+            <a:chOff x="0" y="1227020"/>
+            <a:chExt cx="3473862" cy="904121"/>
           </a:xfrm>
         </p:grpSpPr>
         <p:grpSp>
@@ -8605,7 +8612,7 @@
           </p:nvSpPr>
           <p:spPr>
             <a:xfrm>
-              <a:off x="-11742" y="1259288"/>
+              <a:off x="21982" y="1449089"/>
               <a:ext cx="3183857" cy="438000"/>
             </a:xfrm>
             <a:prstGeom prst="rect">
@@ -8630,45 +8637,6 @@
             </a:p>
           </p:txBody>
         </p:sp>
-        <p:sp>
-          <p:nvSpPr>
-            <p:cNvPr id="13" name="TextBox 12">
-              <a:extLst>
-                <a:ext uri="{FF2B5EF4-FFF2-40B4-BE49-F238E27FC236}">
-                  <a16:creationId xmlns:a16="http://schemas.microsoft.com/office/drawing/2014/main" id="{DCFD9279-2063-4C28-A2EE-A1CED9626D47}"/>
-                </a:ext>
-              </a:extLst>
-            </p:cNvPr>
-            <p:cNvSpPr txBox="1"/>
-            <p:nvPr/>
-          </p:nvSpPr>
-          <p:spPr>
-            <a:xfrm>
-              <a:off x="-12955" y="1724493"/>
-              <a:ext cx="2837764" cy="345676"/>
-            </a:xfrm>
-            <a:prstGeom prst="rect">
-              <a:avLst/>
-            </a:prstGeom>
-            <a:noFill/>
-          </p:spPr>
-          <p:txBody>
-            <a:bodyPr wrap="square" rtlCol="0">
-              <a:spAutoFit/>
-            </a:bodyPr>
-            <a:lstStyle/>
-            <a:p>
-              <a:r>
-                <a:rPr lang="en-US" sz="1486" dirty="0">
-                  <a:solidFill>
-                    <a:schemeClr val="bg1"/>
-                  </a:solidFill>
-                </a:rPr>
-                <a:t>Tuesday, 25 August 2020</a:t>
-              </a:r>
-            </a:p>
-          </p:txBody>
-        </p:sp>
       </p:grpSp>
       <p:sp>
         <p:nvSpPr>
@@ -8684,7 +8652,7 @@
         </p:nvSpPr>
         <p:spPr>
           <a:xfrm>
-            <a:off x="249838" y="2417787"/>
+            <a:off x="231189" y="2136554"/>
             <a:ext cx="3512441" cy="3210431"/>
           </a:xfrm>
           <a:prstGeom prst="rect">
@@ -9165,6 +9133,120 @@
               </a:rPr>
               <a:t>Most of the people that students interact with are not listed as friends</a:t>
             </a:r>
+          </a:p>
+        </p:txBody>
+      </p:sp>
+      <p:sp>
+        <p:nvSpPr>
+          <p:cNvPr id="2" name="TextBox 1">
+            <a:extLst>
+              <a:ext uri="{FF2B5EF4-FFF2-40B4-BE49-F238E27FC236}">
+                <a16:creationId xmlns:a16="http://schemas.microsoft.com/office/drawing/2014/main" id="{5A68B4B8-A593-5F47-A693-3C11B37D9FF4}"/>
+              </a:ext>
+            </a:extLst>
+          </p:cNvPr>
+          <p:cNvSpPr txBox="1"/>
+          <p:nvPr/>
+        </p:nvSpPr>
+        <p:spPr>
+          <a:xfrm>
+            <a:off x="16393817" y="83313"/>
+            <a:ext cx="5320594" cy="4059894"/>
+          </a:xfrm>
+          <a:prstGeom prst="rect">
+            <a:avLst/>
+          </a:prstGeom>
+          <a:noFill/>
+        </p:spPr>
+        <p:txBody>
+          <a:bodyPr wrap="square" rtlCol="0">
+            <a:spAutoFit/>
+          </a:bodyPr>
+          <a:lstStyle/>
+          <a:p>
+            <a:pPr>
+              <a:lnSpc>
+                <a:spcPct val="150000"/>
+              </a:lnSpc>
+            </a:pPr>
+            <a:r>
+              <a:rPr lang="en-US" sz="2600" b="1" dirty="0"/>
+              <a:t>Conclusion</a:t>
+            </a:r>
+          </a:p>
+          <a:p>
+            <a:pPr>
+              <a:lnSpc>
+                <a:spcPct val="150000"/>
+              </a:lnSpc>
+            </a:pPr>
+            <a:r>
+              <a:rPr lang="en-US" sz="1860" b="1" dirty="0"/>
+              <a:t>Based on results from this investigation, it is evident that the schedules of students are closely correlated to with whom and when they interact.  Some possible areas of study for future investigations include factoring in the gender of the students and their known Facebook friendship statuses.</a:t>
+            </a:r>
+          </a:p>
+          <a:p>
+            <a:pPr>
+              <a:lnSpc>
+                <a:spcPct val="150000"/>
+              </a:lnSpc>
+            </a:pPr>
+            <a:endParaRPr lang="en-US" b="1" dirty="0"/>
+          </a:p>
+        </p:txBody>
+      </p:sp>
+      <p:sp>
+        <p:nvSpPr>
+          <p:cNvPr id="3" name="TextBox 2">
+            <a:extLst>
+              <a:ext uri="{FF2B5EF4-FFF2-40B4-BE49-F238E27FC236}">
+                <a16:creationId xmlns:a16="http://schemas.microsoft.com/office/drawing/2014/main" id="{05D1F0C9-7484-CB42-A934-A6256079D91E}"/>
+              </a:ext>
+            </a:extLst>
+          </p:cNvPr>
+          <p:cNvSpPr txBox="1"/>
+          <p:nvPr/>
+        </p:nvSpPr>
+        <p:spPr>
+          <a:xfrm>
+            <a:off x="918784" y="11137612"/>
+            <a:ext cx="21166372" cy="584775"/>
+          </a:xfrm>
+          <a:prstGeom prst="rect">
+            <a:avLst/>
+          </a:prstGeom>
+          <a:noFill/>
+        </p:spPr>
+        <p:txBody>
+          <a:bodyPr wrap="none" rtlCol="0">
+            <a:spAutoFit/>
+          </a:bodyPr>
+          <a:lstStyle/>
+          <a:p>
+            <a:r>
+              <a:rPr lang="en-US" sz="1600" dirty="0"/>
+              <a:t>Sources: </a:t>
+            </a:r>
+            <a:r>
+              <a:rPr lang="en-US" sz="1600" dirty="0">
+                <a:hlinkClick r:id="rId6"/>
+              </a:rPr>
+              <a:t>SocioPatterns high school and contact friendship networks</a:t>
+            </a:r>
+            <a:r>
+              <a:rPr lang="en-US" sz="1600" dirty="0"/>
+              <a:t> and </a:t>
+            </a:r>
+            <a:r>
+              <a:rPr lang="en-US" sz="1600" dirty="0">
+                <a:hlinkClick r:id="rId7"/>
+              </a:rPr>
+              <a:t>Contact Patterns in a High School: A Comparison between Data Collected Using Wearable Sensors, Contact Diaries and Friendship Surveys</a:t>
+            </a:r>
+            <a:endParaRPr lang="en-US" sz="1600" dirty="0"/>
+          </a:p>
+          <a:p>
+            <a:endParaRPr lang="en-US" sz="1600" dirty="0"/>
           </a:p>
         </p:txBody>
       </p:sp>

</xml_diff>